<commit_message>
Add bit algorithm test 2022-07-19
</commit_message>
<xml_diff>
--- a/study-note/자바/2022-07-18 내용정리.pptx
+++ b/study-note/자바/2022-07-18 내용정리.pptx
@@ -115,6 +115,9 @@
     <p:ext uri="{EFAFB233-063F-42B5-8137-9DF3F51BA10A}">
       <p15:sldGuideLst xmlns:p15="http://schemas.microsoft.com/office/powerpoint/2012/main"/>
     </p:ext>
+    <p:ext uri="{2D200454-40CA-4A62-9FC3-DE9A4176ACB9}">
+      <p15:notesGuideLst xmlns:p15="http://schemas.microsoft.com/office/powerpoint/2012/main"/>
+    </p:ext>
   </p:extLst>
 </p:presentation>
 </file>
@@ -466,6 +469,90 @@
     </a:lvl9pPr>
   </p:notesStyle>
 </p:notesMaster>
+</file>
+
+<file path=ppt/notesSlides/notesSlide1.xml><?xml version="1.0" encoding="utf-8"?>
+<p:notes xmlns:a="http://schemas.openxmlformats.org/drawingml/2006/main" xmlns:r="http://schemas.openxmlformats.org/officeDocument/2006/relationships" xmlns:p="http://schemas.openxmlformats.org/presentationml/2006/main">
+  <p:cSld>
+    <p:spTree>
+      <p:nvGrpSpPr>
+        <p:cNvPr id="1" name=""/>
+        <p:cNvGrpSpPr/>
+        <p:nvPr/>
+      </p:nvGrpSpPr>
+      <p:grpSpPr>
+        <a:xfrm>
+          <a:off x="0" y="0"/>
+          <a:ext cx="0" cy="0"/>
+          <a:chOff x="0" y="0"/>
+          <a:chExt cx="0" cy="0"/>
+        </a:xfrm>
+      </p:grpSpPr>
+      <p:sp>
+        <p:nvSpPr>
+          <p:cNvPr id="2" name="슬라이드 이미지 개체 틀 1"/>
+          <p:cNvSpPr>
+            <a:spLocks noGrp="1" noRot="1" noChangeAspect="1"/>
+          </p:cNvSpPr>
+          <p:nvPr>
+            <p:ph type="sldImg"/>
+          </p:nvPr>
+        </p:nvSpPr>
+        <p:spPr/>
+      </p:sp>
+      <p:sp>
+        <p:nvSpPr>
+          <p:cNvPr id="3" name="슬라이드 노트 개체 틀 2"/>
+          <p:cNvSpPr>
+            <a:spLocks noGrp="1"/>
+          </p:cNvSpPr>
+          <p:nvPr>
+            <p:ph type="body" idx="1"/>
+          </p:nvPr>
+        </p:nvSpPr>
+        <p:spPr/>
+        <p:txBody>
+          <a:bodyPr/>
+          <a:lstStyle/>
+          <a:p>
+            <a:endParaRPr lang="ko-KR" altLang="en-US" dirty="0"/>
+          </a:p>
+        </p:txBody>
+      </p:sp>
+      <p:sp>
+        <p:nvSpPr>
+          <p:cNvPr id="4" name="슬라이드 번호 개체 틀 3"/>
+          <p:cNvSpPr>
+            <a:spLocks noGrp="1"/>
+          </p:cNvSpPr>
+          <p:nvPr>
+            <p:ph type="sldNum" sz="quarter" idx="5"/>
+          </p:nvPr>
+        </p:nvSpPr>
+        <p:spPr/>
+        <p:txBody>
+          <a:bodyPr/>
+          <a:lstStyle/>
+          <a:p>
+            <a:fld id="{F44E0BF0-7019-4D60-BACA-B8D14935602F}" type="slidenum">
+              <a:rPr lang="ko-KR" altLang="en-US" smtClean="0"/>
+              <a:t>5</a:t>
+            </a:fld>
+            <a:endParaRPr lang="ko-KR" altLang="en-US"/>
+          </a:p>
+        </p:txBody>
+      </p:sp>
+    </p:spTree>
+    <p:extLst>
+      <p:ext uri="{BB962C8B-B14F-4D97-AF65-F5344CB8AC3E}">
+        <p14:creationId xmlns:p14="http://schemas.microsoft.com/office/powerpoint/2010/main" val="1137616332"/>
+      </p:ext>
+    </p:extLst>
+  </p:cSld>
+  <p:clrMapOvr>
+    <a:masterClrMapping/>
+  </p:clrMapOvr>
+</p:notes>
 </file>
 
 <file path=ppt/slideLayouts/slideLayout1.xml><?xml version="1.0" encoding="utf-8"?>
@@ -5349,7 +5436,12 @@
             <p:ph type="title"/>
           </p:nvPr>
         </p:nvSpPr>
-        <p:spPr/>
+        <p:spPr>
+          <a:xfrm>
+            <a:off x="580748" y="338492"/>
+            <a:ext cx="10515600" cy="1325563"/>
+          </a:xfrm>
+        </p:spPr>
         <p:txBody>
           <a:bodyPr/>
           <a:lstStyle/>
@@ -5384,7 +5476,7 @@
         </p:blipFill>
         <p:spPr>
           <a:xfrm>
-            <a:off x="632928" y="1690688"/>
+            <a:off x="375476" y="1664055"/>
             <a:ext cx="4695825" cy="3914775"/>
           </a:xfrm>
           <a:prstGeom prst="rect">
@@ -5406,7 +5498,7 @@
         </p:nvSpPr>
         <p:spPr>
           <a:xfrm>
-            <a:off x="5889356" y="1828800"/>
+            <a:off x="5631904" y="1802167"/>
             <a:ext cx="1301858" cy="3874576"/>
           </a:xfrm>
           <a:prstGeom prst="rect">
@@ -5452,7 +5544,7 @@
         </p:nvSpPr>
         <p:spPr>
           <a:xfrm>
-            <a:off x="7343614" y="1828800"/>
+            <a:off x="7086162" y="1802167"/>
             <a:ext cx="2807776" cy="3874576"/>
           </a:xfrm>
           <a:prstGeom prst="rect">
@@ -5498,7 +5590,7 @@
         </p:nvSpPr>
         <p:spPr>
           <a:xfrm>
-            <a:off x="10303790" y="1828800"/>
+            <a:off x="10046338" y="1802167"/>
             <a:ext cx="1888210" cy="3874576"/>
           </a:xfrm>
           <a:prstGeom prst="rect">
@@ -5544,7 +5636,7 @@
         </p:nvSpPr>
         <p:spPr>
           <a:xfrm>
-            <a:off x="5889356" y="1113413"/>
+            <a:off x="5631904" y="1086780"/>
             <a:ext cx="1301858" cy="646331"/>
           </a:xfrm>
           <a:prstGeom prst="rect">
@@ -5580,7 +5672,7 @@
         </p:nvSpPr>
         <p:spPr>
           <a:xfrm>
-            <a:off x="7402337" y="1113413"/>
+            <a:off x="7144885" y="1086780"/>
             <a:ext cx="1301858" cy="646331"/>
           </a:xfrm>
           <a:prstGeom prst="rect">
@@ -5622,7 +5714,7 @@
         </p:nvSpPr>
         <p:spPr>
           <a:xfrm>
-            <a:off x="10303790" y="1390412"/>
+            <a:off x="10046338" y="1363779"/>
             <a:ext cx="1301858" cy="369332"/>
           </a:xfrm>
           <a:prstGeom prst="rect">
@@ -5657,7 +5749,7 @@
         </p:nvSpPr>
         <p:spPr>
           <a:xfrm>
-            <a:off x="5916478" y="2136991"/>
+            <a:off x="5659026" y="2110358"/>
             <a:ext cx="1247614" cy="3022169"/>
           </a:xfrm>
           <a:prstGeom prst="rect">
@@ -5705,7 +5797,7 @@
         </p:nvSpPr>
         <p:spPr>
           <a:xfrm>
-            <a:off x="7882179" y="2136990"/>
+            <a:off x="7624727" y="2110357"/>
             <a:ext cx="2145223" cy="1489613"/>
           </a:xfrm>
           <a:prstGeom prst="rect">
@@ -5756,7 +5848,7 @@
         </p:nvSpPr>
         <p:spPr>
           <a:xfrm>
-            <a:off x="7891140" y="2644856"/>
+            <a:off x="7633688" y="2618223"/>
             <a:ext cx="893736" cy="473879"/>
           </a:xfrm>
           <a:prstGeom prst="rect">
@@ -5804,7 +5896,7 @@
         </p:nvSpPr>
         <p:spPr>
           <a:xfrm>
-            <a:off x="8911061" y="2644856"/>
+            <a:off x="8653609" y="2618223"/>
             <a:ext cx="456594" cy="473879"/>
           </a:xfrm>
           <a:prstGeom prst="rect">
@@ -5852,7 +5944,7 @@
         </p:nvSpPr>
         <p:spPr>
           <a:xfrm>
-            <a:off x="9488632" y="2644856"/>
+            <a:off x="9231180" y="2618223"/>
             <a:ext cx="456594" cy="473879"/>
           </a:xfrm>
           <a:prstGeom prst="rect">
@@ -5900,7 +5992,7 @@
         </p:nvSpPr>
         <p:spPr>
           <a:xfrm>
-            <a:off x="7882179" y="3920183"/>
+            <a:off x="7624727" y="3893550"/>
             <a:ext cx="2145223" cy="1489613"/>
           </a:xfrm>
           <a:prstGeom prst="rect">
@@ -5951,7 +6043,7 @@
         </p:nvSpPr>
         <p:spPr>
           <a:xfrm>
-            <a:off x="7891140" y="4428049"/>
+            <a:off x="7633688" y="4401416"/>
             <a:ext cx="893736" cy="473879"/>
           </a:xfrm>
           <a:prstGeom prst="rect">
@@ -5999,7 +6091,7 @@
         </p:nvSpPr>
         <p:spPr>
           <a:xfrm>
-            <a:off x="8911061" y="4428049"/>
+            <a:off x="8653609" y="4401416"/>
             <a:ext cx="456594" cy="473879"/>
           </a:xfrm>
           <a:prstGeom prst="rect">
@@ -6047,7 +6139,7 @@
         </p:nvSpPr>
         <p:spPr>
           <a:xfrm>
-            <a:off x="9488632" y="4428049"/>
+            <a:off x="9231180" y="4401416"/>
             <a:ext cx="456594" cy="473879"/>
           </a:xfrm>
           <a:prstGeom prst="rect">
@@ -6095,7 +6187,7 @@
         </p:nvSpPr>
         <p:spPr>
           <a:xfrm>
-            <a:off x="7944777" y="3309046"/>
+            <a:off x="7687325" y="3282413"/>
             <a:ext cx="216977" cy="722154"/>
           </a:xfrm>
           <a:prstGeom prst="downArrow">
@@ -6141,7 +6233,7 @@
         </p:nvSpPr>
         <p:spPr>
           <a:xfrm>
-            <a:off x="8161754" y="3510993"/>
+            <a:off x="7904302" y="3484360"/>
             <a:ext cx="2338349" cy="369332"/>
           </a:xfrm>
           <a:prstGeom prst="rect">
@@ -6185,7 +6277,7 @@
         </p:nvSpPr>
         <p:spPr>
           <a:xfrm>
-            <a:off x="6149297" y="2802307"/>
+            <a:off x="5891845" y="2775674"/>
             <a:ext cx="893736" cy="1253385"/>
           </a:xfrm>
           <a:prstGeom prst="rect">
@@ -6247,7 +6339,7 @@
         </p:nvSpPr>
         <p:spPr>
           <a:xfrm>
-            <a:off x="8161754" y="5841488"/>
+            <a:off x="7904302" y="5814855"/>
             <a:ext cx="3595027" cy="646331"/>
           </a:xfrm>
           <a:prstGeom prst="rect">
@@ -6299,7 +6391,7 @@
         </p:nvCxnSpPr>
         <p:spPr>
           <a:xfrm rot="5400000">
-            <a:off x="8180844" y="5390707"/>
+            <a:off x="7923392" y="5364074"/>
             <a:ext cx="754858" cy="793037"/>
           </a:xfrm>
           <a:prstGeom prst="bentConnector4">
@@ -6375,7 +6467,7 @@
         </p:nvSpPr>
         <p:spPr>
           <a:xfrm>
-            <a:off x="838200" y="83622"/>
+            <a:off x="669524" y="110255"/>
             <a:ext cx="10515600" cy="1325563"/>
           </a:xfrm>
         </p:spPr>
@@ -6405,7 +6497,7 @@
         </p:nvSpPr>
         <p:spPr>
           <a:xfrm>
-            <a:off x="5889356" y="1828800"/>
+            <a:off x="5720680" y="1855433"/>
             <a:ext cx="1301858" cy="3874576"/>
           </a:xfrm>
           <a:prstGeom prst="rect">
@@ -6451,7 +6543,7 @@
         </p:nvSpPr>
         <p:spPr>
           <a:xfrm>
-            <a:off x="7343614" y="1828800"/>
+            <a:off x="7174938" y="1855433"/>
             <a:ext cx="2807776" cy="3874576"/>
           </a:xfrm>
           <a:prstGeom prst="rect">
@@ -6497,7 +6589,7 @@
         </p:nvSpPr>
         <p:spPr>
           <a:xfrm>
-            <a:off x="10303790" y="1828800"/>
+            <a:off x="10135114" y="1855433"/>
             <a:ext cx="1888210" cy="3874576"/>
           </a:xfrm>
           <a:prstGeom prst="rect">
@@ -6543,7 +6635,7 @@
         </p:nvSpPr>
         <p:spPr>
           <a:xfrm>
-            <a:off x="5889356" y="1113413"/>
+            <a:off x="5720680" y="1140046"/>
             <a:ext cx="1301858" cy="646331"/>
           </a:xfrm>
           <a:prstGeom prst="rect">
@@ -6579,7 +6671,7 @@
         </p:nvSpPr>
         <p:spPr>
           <a:xfrm>
-            <a:off x="7402337" y="1113413"/>
+            <a:off x="7233661" y="1140046"/>
             <a:ext cx="1301858" cy="646331"/>
           </a:xfrm>
           <a:prstGeom prst="rect">
@@ -6621,7 +6713,7 @@
         </p:nvSpPr>
         <p:spPr>
           <a:xfrm>
-            <a:off x="10303790" y="1390412"/>
+            <a:off x="10135114" y="1417045"/>
             <a:ext cx="1301858" cy="369332"/>
           </a:xfrm>
           <a:prstGeom prst="rect">
@@ -6656,7 +6748,7 @@
         </p:nvSpPr>
         <p:spPr>
           <a:xfrm>
-            <a:off x="5916478" y="2136991"/>
+            <a:off x="5747802" y="2163624"/>
             <a:ext cx="1247614" cy="3442399"/>
           </a:xfrm>
           <a:prstGeom prst="rect">
@@ -6704,7 +6796,7 @@
         </p:nvSpPr>
         <p:spPr>
           <a:xfrm>
-            <a:off x="7882179" y="2136990"/>
+            <a:off x="7713503" y="2163623"/>
             <a:ext cx="2145223" cy="1489613"/>
           </a:xfrm>
           <a:prstGeom prst="rect">
@@ -6755,7 +6847,7 @@
         </p:nvSpPr>
         <p:spPr>
           <a:xfrm>
-            <a:off x="8077582" y="2617033"/>
+            <a:off x="7908906" y="2643666"/>
             <a:ext cx="893736" cy="473879"/>
           </a:xfrm>
           <a:prstGeom prst="rect">
@@ -6803,7 +6895,7 @@
         </p:nvSpPr>
         <p:spPr>
           <a:xfrm>
-            <a:off x="9177842" y="2617034"/>
+            <a:off x="9009166" y="2643667"/>
             <a:ext cx="456594" cy="473879"/>
           </a:xfrm>
           <a:prstGeom prst="rect">
@@ -6851,7 +6943,7 @@
         </p:nvSpPr>
         <p:spPr>
           <a:xfrm>
-            <a:off x="7882179" y="3920183"/>
+            <a:off x="7713503" y="3946816"/>
             <a:ext cx="2145223" cy="1489613"/>
           </a:xfrm>
           <a:prstGeom prst="rect">
@@ -6902,7 +6994,7 @@
         </p:nvSpPr>
         <p:spPr>
           <a:xfrm>
-            <a:off x="8115563" y="4428049"/>
+            <a:off x="7946887" y="4454682"/>
             <a:ext cx="632928" cy="473879"/>
           </a:xfrm>
           <a:prstGeom prst="rect">
@@ -6950,7 +7042,7 @@
         </p:nvSpPr>
         <p:spPr>
           <a:xfrm>
-            <a:off x="8971318" y="4428049"/>
+            <a:off x="8802642" y="4454682"/>
             <a:ext cx="893735" cy="473879"/>
           </a:xfrm>
           <a:prstGeom prst="rect">
@@ -6998,7 +7090,7 @@
         </p:nvSpPr>
         <p:spPr>
           <a:xfrm>
-            <a:off x="7944777" y="3309046"/>
+            <a:off x="7776101" y="3335679"/>
             <a:ext cx="216977" cy="722154"/>
           </a:xfrm>
           <a:prstGeom prst="downArrow">
@@ -7044,7 +7136,7 @@
         </p:nvSpPr>
         <p:spPr>
           <a:xfrm>
-            <a:off x="8161754" y="3510993"/>
+            <a:off x="7993078" y="3537626"/>
             <a:ext cx="2338349" cy="369332"/>
           </a:xfrm>
           <a:prstGeom prst="rect">
@@ -7096,7 +7188,7 @@
         </p:blipFill>
         <p:spPr>
           <a:xfrm>
-            <a:off x="274933" y="1587500"/>
+            <a:off x="106257" y="1614133"/>
             <a:ext cx="5362575" cy="4905375"/>
           </a:xfrm>
           <a:prstGeom prst="rect">
@@ -7118,7 +7210,7 @@
         </p:nvSpPr>
         <p:spPr>
           <a:xfrm>
-            <a:off x="5992678" y="4241814"/>
+            <a:off x="5824002" y="4268447"/>
             <a:ext cx="1095214" cy="1253385"/>
           </a:xfrm>
           <a:prstGeom prst="rect">
@@ -7177,7 +7269,7 @@
         </p:nvSpPr>
         <p:spPr>
           <a:xfrm>
-            <a:off x="6176073" y="4882854"/>
+            <a:off x="6007397" y="4909487"/>
             <a:ext cx="271222" cy="386570"/>
           </a:xfrm>
           <a:prstGeom prst="rect">
@@ -7227,7 +7319,7 @@
         </p:nvSpPr>
         <p:spPr>
           <a:xfrm>
-            <a:off x="6620280" y="4882854"/>
+            <a:off x="6451604" y="4909487"/>
             <a:ext cx="271222" cy="386570"/>
           </a:xfrm>
           <a:prstGeom prst="rect">
@@ -7277,7 +7369,7 @@
         </p:nvSpPr>
         <p:spPr>
           <a:xfrm>
-            <a:off x="10417927" y="2038379"/>
+            <a:off x="10249251" y="2065012"/>
             <a:ext cx="1669256" cy="1489613"/>
           </a:xfrm>
           <a:prstGeom prst="rect">
@@ -7332,7 +7424,7 @@
         </p:nvSpPr>
         <p:spPr>
           <a:xfrm>
-            <a:off x="10689955" y="2740463"/>
+            <a:off x="10521279" y="2767096"/>
             <a:ext cx="456594" cy="473879"/>
           </a:xfrm>
           <a:prstGeom prst="rect">
@@ -7380,7 +7472,7 @@
         </p:nvSpPr>
         <p:spPr>
           <a:xfrm>
-            <a:off x="11353073" y="2744235"/>
+            <a:off x="11184397" y="2770868"/>
             <a:ext cx="456594" cy="473879"/>
           </a:xfrm>
           <a:prstGeom prst="rect">
@@ -7428,7 +7520,7 @@
         </p:nvSpPr>
         <p:spPr>
           <a:xfrm>
-            <a:off x="11108068" y="1753906"/>
+            <a:off x="10939392" y="1780539"/>
             <a:ext cx="995159" cy="368728"/>
           </a:xfrm>
           <a:prstGeom prst="ellipse">
@@ -7476,7 +7568,7 @@
         </p:nvSpPr>
         <p:spPr>
           <a:xfrm>
-            <a:off x="7899959" y="4798659"/>
+            <a:off x="7731283" y="4825292"/>
             <a:ext cx="995159" cy="368728"/>
           </a:xfrm>
           <a:prstGeom prst="ellipse">
@@ -7524,7 +7616,7 @@
         </p:nvSpPr>
         <p:spPr>
           <a:xfrm>
-            <a:off x="8895118" y="3003125"/>
+            <a:off x="8726442" y="3029758"/>
             <a:ext cx="1044097" cy="343882"/>
           </a:xfrm>
           <a:prstGeom prst="ellipse">
@@ -7572,7 +7664,7 @@
         </p:nvSpPr>
         <p:spPr>
           <a:xfrm>
-            <a:off x="6110407" y="2802307"/>
+            <a:off x="5941731" y="2828940"/>
             <a:ext cx="893736" cy="1253385"/>
           </a:xfrm>
           <a:prstGeom prst="rect">
@@ -7634,7 +7726,7 @@
         </p:nvSpPr>
         <p:spPr>
           <a:xfrm>
-            <a:off x="8524450" y="5140879"/>
+            <a:off x="8355774" y="5167512"/>
             <a:ext cx="3595027" cy="1477328"/>
           </a:xfrm>
           <a:prstGeom prst="rect">
@@ -7700,7 +7792,7 @@
         </p:nvCxnSpPr>
         <p:spPr>
           <a:xfrm rot="10800000" flipH="1" flipV="1">
-            <a:off x="7882178" y="4664989"/>
+            <a:off x="7713502" y="4691622"/>
             <a:ext cx="642271" cy="1214553"/>
           </a:xfrm>
           <a:prstGeom prst="bentConnector3">
@@ -7745,7 +7837,7 @@
         </p:nvCxnSpPr>
         <p:spPr>
           <a:xfrm rot="5400000">
-            <a:off x="9980817" y="3869140"/>
+            <a:off x="9812141" y="3895773"/>
             <a:ext cx="1612887" cy="930591"/>
           </a:xfrm>
           <a:prstGeom prst="bentConnector3">
@@ -7820,7 +7912,7 @@
         </p:nvSpPr>
         <p:spPr>
           <a:xfrm>
-            <a:off x="838200" y="83622"/>
+            <a:off x="767179" y="136888"/>
             <a:ext cx="10515600" cy="1325563"/>
           </a:xfrm>
         </p:spPr>
@@ -7850,7 +7942,7 @@
         </p:nvSpPr>
         <p:spPr>
           <a:xfrm>
-            <a:off x="5889356" y="1828800"/>
+            <a:off x="5818335" y="1882066"/>
             <a:ext cx="1301858" cy="3874576"/>
           </a:xfrm>
           <a:prstGeom prst="rect">
@@ -7896,7 +7988,7 @@
         </p:nvSpPr>
         <p:spPr>
           <a:xfrm>
-            <a:off x="7343614" y="1828800"/>
+            <a:off x="7272593" y="1882066"/>
             <a:ext cx="2807776" cy="3874576"/>
           </a:xfrm>
           <a:prstGeom prst="rect">
@@ -7942,7 +8034,7 @@
         </p:nvSpPr>
         <p:spPr>
           <a:xfrm>
-            <a:off x="10303790" y="1828800"/>
+            <a:off x="10232769" y="1882066"/>
             <a:ext cx="1888210" cy="3874576"/>
           </a:xfrm>
           <a:prstGeom prst="rect">
@@ -7988,7 +8080,7 @@
         </p:nvSpPr>
         <p:spPr>
           <a:xfrm>
-            <a:off x="5889356" y="1113413"/>
+            <a:off x="5818335" y="1166679"/>
             <a:ext cx="1301858" cy="646331"/>
           </a:xfrm>
           <a:prstGeom prst="rect">
@@ -8024,7 +8116,7 @@
         </p:nvSpPr>
         <p:spPr>
           <a:xfrm>
-            <a:off x="7402337" y="1113413"/>
+            <a:off x="7331316" y="1166679"/>
             <a:ext cx="1301858" cy="646331"/>
           </a:xfrm>
           <a:prstGeom prst="rect">
@@ -8066,7 +8158,7 @@
         </p:nvSpPr>
         <p:spPr>
           <a:xfrm>
-            <a:off x="10303790" y="1390412"/>
+            <a:off x="10232769" y="1443678"/>
             <a:ext cx="1301858" cy="369332"/>
           </a:xfrm>
           <a:prstGeom prst="rect">
@@ -8101,7 +8193,7 @@
         </p:nvSpPr>
         <p:spPr>
           <a:xfrm>
-            <a:off x="5916478" y="2136991"/>
+            <a:off x="5845457" y="2190257"/>
             <a:ext cx="1247614" cy="3442399"/>
           </a:xfrm>
           <a:prstGeom prst="rect">
@@ -8149,7 +8241,7 @@
         </p:nvSpPr>
         <p:spPr>
           <a:xfrm>
-            <a:off x="7882179" y="2136990"/>
+            <a:off x="7811158" y="2190256"/>
             <a:ext cx="2145223" cy="1489613"/>
           </a:xfrm>
           <a:prstGeom prst="rect">
@@ -8200,7 +8292,7 @@
         </p:nvSpPr>
         <p:spPr>
           <a:xfrm>
-            <a:off x="7966897" y="2543086"/>
+            <a:off x="7895876" y="2596352"/>
             <a:ext cx="893736" cy="473879"/>
           </a:xfrm>
           <a:prstGeom prst="rect">
@@ -8248,7 +8340,7 @@
         </p:nvSpPr>
         <p:spPr>
           <a:xfrm>
-            <a:off x="9339051" y="2489270"/>
+            <a:off x="9268030" y="2542536"/>
             <a:ext cx="456594" cy="547827"/>
           </a:xfrm>
           <a:prstGeom prst="rect">
@@ -8296,7 +8388,7 @@
         </p:nvSpPr>
         <p:spPr>
           <a:xfrm>
-            <a:off x="7882179" y="3920183"/>
+            <a:off x="7811158" y="3973449"/>
             <a:ext cx="2145223" cy="1489613"/>
           </a:xfrm>
           <a:prstGeom prst="rect">
@@ -8347,7 +8439,7 @@
         </p:nvSpPr>
         <p:spPr>
           <a:xfrm>
-            <a:off x="8115563" y="4428049"/>
+            <a:off x="8044542" y="4481315"/>
             <a:ext cx="632928" cy="473879"/>
           </a:xfrm>
           <a:prstGeom prst="rect">
@@ -8395,7 +8487,7 @@
         </p:nvSpPr>
         <p:spPr>
           <a:xfrm>
-            <a:off x="8161754" y="3510993"/>
+            <a:off x="8090733" y="3564259"/>
             <a:ext cx="2338349" cy="369332"/>
           </a:xfrm>
           <a:prstGeom prst="rect">
@@ -8439,7 +8531,7 @@
         </p:nvSpPr>
         <p:spPr>
           <a:xfrm>
-            <a:off x="5992678" y="4241814"/>
+            <a:off x="5921657" y="4295080"/>
             <a:ext cx="1095214" cy="1253385"/>
           </a:xfrm>
           <a:prstGeom prst="rect">
@@ -8498,7 +8590,7 @@
         </p:nvSpPr>
         <p:spPr>
           <a:xfrm>
-            <a:off x="6176073" y="4882854"/>
+            <a:off x="6105052" y="4936120"/>
             <a:ext cx="271222" cy="386570"/>
           </a:xfrm>
           <a:prstGeom prst="rect">
@@ -8548,7 +8640,7 @@
         </p:nvSpPr>
         <p:spPr>
           <a:xfrm>
-            <a:off x="6620280" y="4882854"/>
+            <a:off x="6549259" y="4936120"/>
             <a:ext cx="271222" cy="386570"/>
           </a:xfrm>
           <a:prstGeom prst="rect">
@@ -8598,7 +8690,7 @@
         </p:nvSpPr>
         <p:spPr>
           <a:xfrm>
-            <a:off x="10417927" y="2038379"/>
+            <a:off x="10346906" y="2091645"/>
             <a:ext cx="1669256" cy="1489613"/>
           </a:xfrm>
           <a:prstGeom prst="rect">
@@ -8653,7 +8745,7 @@
         </p:nvSpPr>
         <p:spPr>
           <a:xfrm>
-            <a:off x="10689955" y="2740463"/>
+            <a:off x="10618934" y="2793729"/>
             <a:ext cx="456594" cy="473879"/>
           </a:xfrm>
           <a:prstGeom prst="rect">
@@ -8701,7 +8793,7 @@
         </p:nvSpPr>
         <p:spPr>
           <a:xfrm>
-            <a:off x="11353073" y="2744235"/>
+            <a:off x="11282052" y="2797501"/>
             <a:ext cx="456594" cy="473879"/>
           </a:xfrm>
           <a:prstGeom prst="rect">
@@ -8749,7 +8841,7 @@
         </p:nvSpPr>
         <p:spPr>
           <a:xfrm>
-            <a:off x="11108068" y="1753906"/>
+            <a:off x="11037047" y="1807172"/>
             <a:ext cx="995159" cy="368728"/>
           </a:xfrm>
           <a:prstGeom prst="ellipse">
@@ -8797,7 +8889,7 @@
         </p:nvSpPr>
         <p:spPr>
           <a:xfrm>
-            <a:off x="7899959" y="4798659"/>
+            <a:off x="7828938" y="4851925"/>
             <a:ext cx="995159" cy="368728"/>
           </a:xfrm>
           <a:prstGeom prst="ellipse">
@@ -8845,7 +8937,7 @@
         </p:nvSpPr>
         <p:spPr>
           <a:xfrm>
-            <a:off x="9056327" y="2895647"/>
+            <a:off x="8985306" y="2948913"/>
             <a:ext cx="1044097" cy="397544"/>
           </a:xfrm>
           <a:prstGeom prst="ellipse">
@@ -8894,14 +8986,14 @@
           <p:nvPr/>
         </p:nvPicPr>
         <p:blipFill>
-          <a:blip r:embed="rId2"/>
+          <a:blip r:embed="rId3"/>
           <a:stretch>
             <a:fillRect/>
           </a:stretch>
         </p:blipFill>
         <p:spPr>
           <a:xfrm>
-            <a:off x="162954" y="1503900"/>
+            <a:off x="91933" y="1557166"/>
             <a:ext cx="5591175" cy="4524375"/>
           </a:xfrm>
           <a:prstGeom prst="rect">
@@ -8923,7 +9015,7 @@
         </p:nvSpPr>
         <p:spPr>
           <a:xfrm>
-            <a:off x="7919068" y="3009449"/>
+            <a:off x="7848047" y="3062715"/>
             <a:ext cx="456594" cy="473879"/>
           </a:xfrm>
           <a:prstGeom prst="rect">
@@ -8971,7 +9063,7 @@
         </p:nvSpPr>
         <p:spPr>
           <a:xfrm>
-            <a:off x="8507301" y="2995418"/>
+            <a:off x="8436280" y="3048684"/>
             <a:ext cx="456594" cy="473879"/>
           </a:xfrm>
           <a:prstGeom prst="rect">
@@ -9019,7 +9111,7 @@
         </p:nvSpPr>
         <p:spPr>
           <a:xfrm>
-            <a:off x="7886433" y="3568638"/>
+            <a:off x="7815412" y="3621904"/>
             <a:ext cx="216977" cy="722154"/>
           </a:xfrm>
           <a:prstGeom prst="downArrow">
@@ -9065,7 +9157,7 @@
         </p:nvSpPr>
         <p:spPr>
           <a:xfrm>
-            <a:off x="8953673" y="4381488"/>
+            <a:off x="8882652" y="4434754"/>
             <a:ext cx="456594" cy="473879"/>
           </a:xfrm>
           <a:prstGeom prst="rect">
@@ -9113,7 +9205,7 @@
         </p:nvSpPr>
         <p:spPr>
           <a:xfrm>
-            <a:off x="9616791" y="4385260"/>
+            <a:off x="9545770" y="4438526"/>
             <a:ext cx="456594" cy="473879"/>
           </a:xfrm>
           <a:prstGeom prst="rect">
@@ -9161,7 +9253,7 @@
         </p:nvSpPr>
         <p:spPr>
           <a:xfrm>
-            <a:off x="6110891" y="2763183"/>
+            <a:off x="6039870" y="2816449"/>
             <a:ext cx="893736" cy="1253385"/>
           </a:xfrm>
           <a:prstGeom prst="rect">

</xml_diff>